<commit_message>
add perulangan dan percabangan
</commit_message>
<xml_diff>
--- a/C++ Dasar.pptx
+++ b/C++ Dasar.pptx
@@ -18,6 +18,14 @@
     <p:sldId id="266" r:id="rId12"/>
     <p:sldId id="269" r:id="rId13"/>
     <p:sldId id="268" r:id="rId14"/>
+    <p:sldId id="271" r:id="rId15"/>
+    <p:sldId id="272" r:id="rId16"/>
+    <p:sldId id="273" r:id="rId17"/>
+    <p:sldId id="274" r:id="rId18"/>
+    <p:sldId id="270" r:id="rId19"/>
+    <p:sldId id="275" r:id="rId20"/>
+    <p:sldId id="276" r:id="rId21"/>
+    <p:sldId id="277" r:id="rId22"/>
   </p:sldIdLst>
   <p:sldSz cx="9144000" cy="6858000" type="screen4x3"/>
   <p:notesSz cx="6858000" cy="9144000"/>
@@ -426,7 +434,7 @@
             <a:fld id="{12DDBC58-6F82-4A75-B9B4-D1755313676A}" type="datetimeFigureOut">
               <a:rPr lang="id-ID" smtClean="0"/>
               <a:pPr/>
-              <a:t>04/09/2025</a:t>
+              <a:t>13/09/2025</a:t>
             </a:fld>
             <a:endParaRPr lang="id-ID"/>
           </a:p>
@@ -613,7 +621,7 @@
             <a:fld id="{12DDBC58-6F82-4A75-B9B4-D1755313676A}" type="datetimeFigureOut">
               <a:rPr lang="id-ID" smtClean="0"/>
               <a:pPr/>
-              <a:t>04/09/2025</a:t>
+              <a:t>13/09/2025</a:t>
             </a:fld>
             <a:endParaRPr lang="id-ID"/>
           </a:p>
@@ -800,7 +808,7 @@
             <a:fld id="{12DDBC58-6F82-4A75-B9B4-D1755313676A}" type="datetimeFigureOut">
               <a:rPr lang="id-ID" smtClean="0"/>
               <a:pPr/>
-              <a:t>04/09/2025</a:t>
+              <a:t>13/09/2025</a:t>
             </a:fld>
             <a:endParaRPr lang="id-ID"/>
           </a:p>
@@ -987,7 +995,7 @@
             <a:fld id="{12DDBC58-6F82-4A75-B9B4-D1755313676A}" type="datetimeFigureOut">
               <a:rPr lang="id-ID" smtClean="0"/>
               <a:pPr/>
-              <a:t>04/09/2025</a:t>
+              <a:t>13/09/2025</a:t>
             </a:fld>
             <a:endParaRPr lang="id-ID"/>
           </a:p>
@@ -1370,7 +1378,7 @@
             <a:fld id="{12DDBC58-6F82-4A75-B9B4-D1755313676A}" type="datetimeFigureOut">
               <a:rPr lang="id-ID" smtClean="0"/>
               <a:pPr/>
-              <a:t>04/09/2025</a:t>
+              <a:t>13/09/2025</a:t>
             </a:fld>
             <a:endParaRPr lang="id-ID"/>
           </a:p>
@@ -1641,7 +1649,7 @@
             <a:fld id="{12DDBC58-6F82-4A75-B9B4-D1755313676A}" type="datetimeFigureOut">
               <a:rPr lang="id-ID" smtClean="0"/>
               <a:pPr/>
-              <a:t>04/09/2025</a:t>
+              <a:t>13/09/2025</a:t>
             </a:fld>
             <a:endParaRPr lang="id-ID"/>
           </a:p>
@@ -2028,7 +2036,7 @@
             <a:fld id="{12DDBC58-6F82-4A75-B9B4-D1755313676A}" type="datetimeFigureOut">
               <a:rPr lang="id-ID" smtClean="0"/>
               <a:pPr/>
-              <a:t>04/09/2025</a:t>
+              <a:t>13/09/2025</a:t>
             </a:fld>
             <a:endParaRPr lang="id-ID"/>
           </a:p>
@@ -2151,7 +2159,7 @@
             <a:fld id="{12DDBC58-6F82-4A75-B9B4-D1755313676A}" type="datetimeFigureOut">
               <a:rPr lang="id-ID" smtClean="0"/>
               <a:pPr/>
-              <a:t>04/09/2025</a:t>
+              <a:t>13/09/2025</a:t>
             </a:fld>
             <a:endParaRPr lang="id-ID"/>
           </a:p>
@@ -2333,7 +2341,7 @@
             <a:fld id="{12DDBC58-6F82-4A75-B9B4-D1755313676A}" type="datetimeFigureOut">
               <a:rPr lang="id-ID" smtClean="0"/>
               <a:pPr/>
-              <a:t>04/09/2025</a:t>
+              <a:t>13/09/2025</a:t>
             </a:fld>
             <a:endParaRPr lang="id-ID"/>
           </a:p>
@@ -2669,7 +2677,7 @@
             <a:fld id="{12DDBC58-6F82-4A75-B9B4-D1755313676A}" type="datetimeFigureOut">
               <a:rPr lang="id-ID" smtClean="0"/>
               <a:pPr/>
-              <a:t>04/09/2025</a:t>
+              <a:t>13/09/2025</a:t>
             </a:fld>
             <a:endParaRPr lang="id-ID"/>
           </a:p>
@@ -3040,7 +3048,7 @@
             <a:fld id="{12DDBC58-6F82-4A75-B9B4-D1755313676A}" type="datetimeFigureOut">
               <a:rPr lang="id-ID" smtClean="0"/>
               <a:pPr/>
-              <a:t>04/09/2025</a:t>
+              <a:t>13/09/2025</a:t>
             </a:fld>
             <a:endParaRPr lang="id-ID"/>
           </a:p>
@@ -3460,7 +3468,7 @@
             <a:fld id="{12DDBC58-6F82-4A75-B9B4-D1755313676A}" type="datetimeFigureOut">
               <a:rPr lang="id-ID" smtClean="0"/>
               <a:pPr/>
-              <a:t>04/09/2025</a:t>
+              <a:t>13/09/2025</a:t>
             </a:fld>
             <a:endParaRPr lang="id-ID"/>
           </a:p>
@@ -3958,6 +3966,13 @@
   <p:clrMapOvr>
     <a:masterClrMapping/>
   </p:clrMapOvr>
+  <p:timing>
+    <p:tnLst>
+      <p:par>
+        <p:cTn id="1" dur="indefinite" restart="never" nodeType="tmRoot"/>
+      </p:par>
+    </p:tnLst>
+  </p:timing>
 </p:sld>
 </file>
 
@@ -4642,6 +4657,13 @@
   <p:clrMapOvr>
     <a:masterClrMapping/>
   </p:clrMapOvr>
+  <p:timing>
+    <p:tnLst>
+      <p:par>
+        <p:cTn id="1" dur="indefinite" restart="never" nodeType="tmRoot"/>
+      </p:par>
+    </p:tnLst>
+  </p:timing>
 </p:sld>
 </file>
 
@@ -5091,6 +5113,13 @@
   <p:clrMapOvr>
     <a:masterClrMapping/>
   </p:clrMapOvr>
+  <p:timing>
+    <p:tnLst>
+      <p:par>
+        <p:cTn id="1" dur="indefinite" restart="never" nodeType="tmRoot"/>
+      </p:par>
+    </p:tnLst>
+  </p:timing>
 </p:sld>
 </file>
 
@@ -5848,6 +5877,990 @@
 </p:sld>
 </file>
 
+<file path=ppt/slides/slide14.xml><?xml version="1.0" encoding="utf-8"?>
+<p:sld xmlns:a="http://schemas.openxmlformats.org/drawingml/2006/main" xmlns:r="http://schemas.openxmlformats.org/officeDocument/2006/relationships" xmlns:p="http://schemas.openxmlformats.org/presentationml/2006/main">
+  <p:cSld>
+    <p:spTree>
+      <p:nvGrpSpPr>
+        <p:cNvPr id="1" name=""/>
+        <p:cNvGrpSpPr/>
+        <p:nvPr/>
+      </p:nvGrpSpPr>
+      <p:grpSpPr>
+        <a:xfrm>
+          <a:off x="0" y="0"/>
+          <a:ext cx="0" cy="0"/>
+          <a:chOff x="0" y="0"/>
+          <a:chExt cx="0" cy="0"/>
+        </a:xfrm>
+      </p:grpSpPr>
+      <p:sp>
+        <p:nvSpPr>
+          <p:cNvPr id="2" name="Title 1"/>
+          <p:cNvSpPr>
+            <a:spLocks noGrp="1"/>
+          </p:cNvSpPr>
+          <p:nvPr>
+            <p:ph type="title"/>
+          </p:nvPr>
+        </p:nvSpPr>
+        <p:spPr/>
+        <p:txBody>
+          <a:bodyPr anchor="ctr"/>
+          <a:lstStyle/>
+          <a:p>
+            <a:pPr algn="ctr"/>
+            <a:r>
+              <a:rPr lang="id-ID" dirty="0" smtClean="0"/>
+              <a:t>Percabangan</a:t>
+            </a:r>
+            <a:endParaRPr lang="id-ID" dirty="0"/>
+          </a:p>
+        </p:txBody>
+      </p:sp>
+      <p:sp>
+        <p:nvSpPr>
+          <p:cNvPr id="3" name="Content Placeholder 2"/>
+          <p:cNvSpPr>
+            <a:spLocks noGrp="1"/>
+          </p:cNvSpPr>
+          <p:nvPr>
+            <p:ph idx="1"/>
+          </p:nvPr>
+        </p:nvSpPr>
+        <p:spPr/>
+        <p:txBody>
+          <a:bodyPr>
+            <a:noAutofit/>
+          </a:bodyPr>
+          <a:lstStyle/>
+          <a:p>
+            <a:pPr>
+              <a:buNone/>
+            </a:pPr>
+            <a:r>
+              <a:rPr lang="id-ID" sz="1600" dirty="0" smtClean="0"/>
+              <a:t>Dengan if:</a:t>
+            </a:r>
+          </a:p>
+          <a:p>
+            <a:endParaRPr lang="id-ID" sz="1600" dirty="0" smtClean="0"/>
+          </a:p>
+          <a:p>
+            <a:r>
+              <a:rPr lang="id-ID" sz="1600" dirty="0" smtClean="0"/>
+              <a:t>#include &lt;iostream&gt;</a:t>
+            </a:r>
+          </a:p>
+          <a:p>
+            <a:r>
+              <a:rPr lang="id-ID" sz="1600" dirty="0" smtClean="0"/>
+              <a:t>using namespace std;</a:t>
+            </a:r>
+          </a:p>
+          <a:p>
+            <a:endParaRPr lang="id-ID" sz="1600" dirty="0" smtClean="0"/>
+          </a:p>
+          <a:p>
+            <a:r>
+              <a:rPr lang="id-ID" sz="1600" dirty="0" smtClean="0"/>
+              <a:t>int main() {</a:t>
+            </a:r>
+          </a:p>
+          <a:p>
+            <a:r>
+              <a:rPr lang="id-ID" sz="1600" dirty="0" smtClean="0"/>
+              <a:t>    int umur;</a:t>
+            </a:r>
+          </a:p>
+          <a:p>
+            <a:r>
+              <a:rPr lang="id-ID" sz="1600" dirty="0" smtClean="0"/>
+              <a:t>    cout &lt;&lt; "Masukkan umur: ";</a:t>
+            </a:r>
+          </a:p>
+          <a:p>
+            <a:r>
+              <a:rPr lang="id-ID" sz="1600" dirty="0" smtClean="0"/>
+              <a:t>    cin &gt;&gt; umur;</a:t>
+            </a:r>
+          </a:p>
+          <a:p>
+            <a:endParaRPr lang="id-ID" sz="1600" dirty="0" smtClean="0"/>
+          </a:p>
+          <a:p>
+            <a:r>
+              <a:rPr lang="id-ID" sz="1600" dirty="0" smtClean="0"/>
+              <a:t>    if (umur &gt;= 18) {</a:t>
+            </a:r>
+          </a:p>
+          <a:p>
+            <a:r>
+              <a:rPr lang="id-ID" sz="1600" dirty="0" smtClean="0"/>
+              <a:t>        cout &lt;&lt; "Kamu sudah dewasa.\n";</a:t>
+            </a:r>
+          </a:p>
+          <a:p>
+            <a:r>
+              <a:rPr lang="id-ID" sz="1600" dirty="0" smtClean="0"/>
+              <a:t>    }</a:t>
+            </a:r>
+          </a:p>
+          <a:p>
+            <a:endParaRPr lang="id-ID" sz="1600" dirty="0" smtClean="0"/>
+          </a:p>
+          <a:p>
+            <a:r>
+              <a:rPr lang="id-ID" sz="1600" dirty="0" smtClean="0"/>
+              <a:t>    return 0;</a:t>
+            </a:r>
+          </a:p>
+          <a:p>
+            <a:r>
+              <a:rPr lang="id-ID" sz="1600" dirty="0" smtClean="0"/>
+              <a:t>}</a:t>
+            </a:r>
+          </a:p>
+          <a:p>
+            <a:endParaRPr lang="id-ID" sz="1600" dirty="0"/>
+          </a:p>
+        </p:txBody>
+      </p:sp>
+    </p:spTree>
+  </p:cSld>
+  <p:clrMapOvr>
+    <a:masterClrMapping/>
+  </p:clrMapOvr>
+</p:sld>
+</file>
+
+<file path=ppt/slides/slide15.xml><?xml version="1.0" encoding="utf-8"?>
+<p:sld xmlns:a="http://schemas.openxmlformats.org/drawingml/2006/main" xmlns:r="http://schemas.openxmlformats.org/officeDocument/2006/relationships" xmlns:p="http://schemas.openxmlformats.org/presentationml/2006/main">
+  <p:cSld>
+    <p:spTree>
+      <p:nvGrpSpPr>
+        <p:cNvPr id="1" name=""/>
+        <p:cNvGrpSpPr/>
+        <p:nvPr/>
+      </p:nvGrpSpPr>
+      <p:grpSpPr>
+        <a:xfrm>
+          <a:off x="0" y="0"/>
+          <a:ext cx="0" cy="0"/>
+          <a:chOff x="0" y="0"/>
+          <a:chExt cx="0" cy="0"/>
+        </a:xfrm>
+      </p:grpSpPr>
+      <p:sp>
+        <p:nvSpPr>
+          <p:cNvPr id="3" name="Content Placeholder 2"/>
+          <p:cNvSpPr>
+            <a:spLocks noGrp="1"/>
+          </p:cNvSpPr>
+          <p:nvPr>
+            <p:ph idx="1"/>
+          </p:nvPr>
+        </p:nvSpPr>
+        <p:spPr/>
+        <p:txBody>
+          <a:bodyPr>
+            <a:noAutofit/>
+          </a:bodyPr>
+          <a:lstStyle/>
+          <a:p>
+            <a:pPr>
+              <a:buNone/>
+            </a:pPr>
+            <a:r>
+              <a:rPr lang="id-ID" sz="1800" dirty="0" smtClean="0"/>
+              <a:t>Dengan if-else</a:t>
+            </a:r>
+          </a:p>
+          <a:p>
+            <a:endParaRPr lang="id-ID" sz="1800" dirty="0" smtClean="0"/>
+          </a:p>
+          <a:p>
+            <a:r>
+              <a:rPr lang="id-ID" sz="1800" dirty="0" smtClean="0"/>
+              <a:t>#include &lt;iostream&gt;</a:t>
+            </a:r>
+          </a:p>
+          <a:p>
+            <a:r>
+              <a:rPr lang="id-ID" sz="1800" dirty="0" smtClean="0"/>
+              <a:t>using namespace std;</a:t>
+            </a:r>
+          </a:p>
+          <a:p>
+            <a:endParaRPr lang="id-ID" sz="1800" dirty="0" smtClean="0"/>
+          </a:p>
+          <a:p>
+            <a:r>
+              <a:rPr lang="id-ID" sz="1800" dirty="0" smtClean="0"/>
+              <a:t>int main() {</a:t>
+            </a:r>
+          </a:p>
+          <a:p>
+            <a:r>
+              <a:rPr lang="id-ID" sz="1800" dirty="0" smtClean="0"/>
+              <a:t>    int nilai;</a:t>
+            </a:r>
+          </a:p>
+          <a:p>
+            <a:r>
+              <a:rPr lang="id-ID" sz="1800" dirty="0" smtClean="0"/>
+              <a:t>    cout &lt;&lt; "Masukkan nilai: ";</a:t>
+            </a:r>
+          </a:p>
+          <a:p>
+            <a:r>
+              <a:rPr lang="id-ID" sz="1800" dirty="0" smtClean="0"/>
+              <a:t>    cin &gt;&gt; nilai;</a:t>
+            </a:r>
+          </a:p>
+          <a:p>
+            <a:endParaRPr lang="id-ID" sz="1800" dirty="0" smtClean="0"/>
+          </a:p>
+          <a:p>
+            <a:r>
+              <a:rPr lang="id-ID" sz="1800" dirty="0" smtClean="0"/>
+              <a:t>    if (nilai &gt;= 60) {</a:t>
+            </a:r>
+          </a:p>
+          <a:p>
+            <a:r>
+              <a:rPr lang="id-ID" sz="1800" dirty="0" smtClean="0"/>
+              <a:t>        cout &lt;&lt; "Lulus!\n";</a:t>
+            </a:r>
+          </a:p>
+          <a:p>
+            <a:r>
+              <a:rPr lang="id-ID" sz="1800" dirty="0" smtClean="0"/>
+              <a:t>    } else {</a:t>
+            </a:r>
+          </a:p>
+          <a:p>
+            <a:r>
+              <a:rPr lang="id-ID" sz="1800" dirty="0" smtClean="0"/>
+              <a:t>        cout &lt;&lt; "Tidak lulus.\n";</a:t>
+            </a:r>
+          </a:p>
+          <a:p>
+            <a:r>
+              <a:rPr lang="id-ID" sz="1800" dirty="0" smtClean="0"/>
+              <a:t>    }</a:t>
+            </a:r>
+          </a:p>
+          <a:p>
+            <a:endParaRPr lang="id-ID" sz="1800" dirty="0" smtClean="0"/>
+          </a:p>
+          <a:p>
+            <a:r>
+              <a:rPr lang="id-ID" sz="1800" dirty="0" smtClean="0"/>
+              <a:t>    return 0;</a:t>
+            </a:r>
+          </a:p>
+          <a:p>
+            <a:r>
+              <a:rPr lang="id-ID" sz="1800" dirty="0" smtClean="0"/>
+              <a:t>}</a:t>
+            </a:r>
+          </a:p>
+          <a:p>
+            <a:endParaRPr lang="id-ID" sz="1800" dirty="0"/>
+          </a:p>
+        </p:txBody>
+      </p:sp>
+    </p:spTree>
+  </p:cSld>
+  <p:clrMapOvr>
+    <a:masterClrMapping/>
+  </p:clrMapOvr>
+</p:sld>
+</file>
+
+<file path=ppt/slides/slide16.xml><?xml version="1.0" encoding="utf-8"?>
+<p:sld xmlns:a="http://schemas.openxmlformats.org/drawingml/2006/main" xmlns:r="http://schemas.openxmlformats.org/officeDocument/2006/relationships" xmlns:p="http://schemas.openxmlformats.org/presentationml/2006/main">
+  <p:cSld>
+    <p:spTree>
+      <p:nvGrpSpPr>
+        <p:cNvPr id="1" name=""/>
+        <p:cNvGrpSpPr/>
+        <p:nvPr/>
+      </p:nvGrpSpPr>
+      <p:grpSpPr>
+        <a:xfrm>
+          <a:off x="0" y="0"/>
+          <a:ext cx="0" cy="0"/>
+          <a:chOff x="0" y="0"/>
+          <a:chExt cx="0" cy="0"/>
+        </a:xfrm>
+      </p:grpSpPr>
+      <p:sp>
+        <p:nvSpPr>
+          <p:cNvPr id="3" name="Content Placeholder 2"/>
+          <p:cNvSpPr>
+            <a:spLocks noGrp="1"/>
+          </p:cNvSpPr>
+          <p:nvPr>
+            <p:ph idx="1"/>
+          </p:nvPr>
+        </p:nvSpPr>
+        <p:spPr/>
+        <p:txBody>
+          <a:bodyPr>
+            <a:noAutofit/>
+          </a:bodyPr>
+          <a:lstStyle/>
+          <a:p>
+            <a:pPr>
+              <a:buNone/>
+            </a:pPr>
+            <a:r>
+              <a:rPr lang="id-ID" sz="1400" dirty="0" smtClean="0"/>
+              <a:t>Dengan if-else if-else</a:t>
+            </a:r>
+          </a:p>
+          <a:p>
+            <a:endParaRPr lang="id-ID" sz="1400" dirty="0" smtClean="0"/>
+          </a:p>
+          <a:p>
+            <a:r>
+              <a:rPr lang="id-ID" sz="1400" dirty="0" smtClean="0"/>
+              <a:t>#include &lt;iostream&gt;</a:t>
+            </a:r>
+          </a:p>
+          <a:p>
+            <a:r>
+              <a:rPr lang="id-ID" sz="1400" dirty="0" smtClean="0"/>
+              <a:t>using namespace std;</a:t>
+            </a:r>
+          </a:p>
+          <a:p>
+            <a:endParaRPr lang="id-ID" sz="1400" dirty="0" smtClean="0"/>
+          </a:p>
+          <a:p>
+            <a:r>
+              <a:rPr lang="id-ID" sz="1400" dirty="0" smtClean="0"/>
+              <a:t>int main() {</a:t>
+            </a:r>
+          </a:p>
+          <a:p>
+            <a:r>
+              <a:rPr lang="id-ID" sz="1400" dirty="0" smtClean="0"/>
+              <a:t>    int nilai;</a:t>
+            </a:r>
+          </a:p>
+          <a:p>
+            <a:r>
+              <a:rPr lang="id-ID" sz="1400" dirty="0" smtClean="0"/>
+              <a:t>    cout &lt;&lt; "Masukkan nilai: ";</a:t>
+            </a:r>
+          </a:p>
+          <a:p>
+            <a:r>
+              <a:rPr lang="id-ID" sz="1400" dirty="0" smtClean="0"/>
+              <a:t>    cin &gt;&gt; nilai;</a:t>
+            </a:r>
+          </a:p>
+          <a:p>
+            <a:endParaRPr lang="id-ID" sz="1400" dirty="0" smtClean="0"/>
+          </a:p>
+          <a:p>
+            <a:r>
+              <a:rPr lang="id-ID" sz="1400" dirty="0" smtClean="0"/>
+              <a:t>    if (nilai &gt;= 90) {</a:t>
+            </a:r>
+          </a:p>
+          <a:p>
+            <a:r>
+              <a:rPr lang="id-ID" sz="1400" dirty="0" smtClean="0"/>
+              <a:t>        cout &lt;&lt; "Grade A\n";</a:t>
+            </a:r>
+          </a:p>
+          <a:p>
+            <a:r>
+              <a:rPr lang="id-ID" sz="1400" dirty="0" smtClean="0"/>
+              <a:t>    } else if (nilai &gt;= 75) {</a:t>
+            </a:r>
+          </a:p>
+          <a:p>
+            <a:r>
+              <a:rPr lang="id-ID" sz="1400" dirty="0" smtClean="0"/>
+              <a:t>        cout &lt;&lt; "Grade B\n";</a:t>
+            </a:r>
+          </a:p>
+          <a:p>
+            <a:r>
+              <a:rPr lang="id-ID" sz="1400" dirty="0" smtClean="0"/>
+              <a:t>    } else if (nilai &gt;= 60) {</a:t>
+            </a:r>
+          </a:p>
+          <a:p>
+            <a:r>
+              <a:rPr lang="id-ID" sz="1400" dirty="0" smtClean="0"/>
+              <a:t>        cout &lt;&lt; "Grade C\n";</a:t>
+            </a:r>
+          </a:p>
+          <a:p>
+            <a:r>
+              <a:rPr lang="id-ID" sz="1400" dirty="0" smtClean="0"/>
+              <a:t>    } else {</a:t>
+            </a:r>
+          </a:p>
+          <a:p>
+            <a:r>
+              <a:rPr lang="id-ID" sz="1400" dirty="0" smtClean="0"/>
+              <a:t>        cout &lt;&lt; "Grade D\n";</a:t>
+            </a:r>
+          </a:p>
+          <a:p>
+            <a:r>
+              <a:rPr lang="id-ID" sz="1400" dirty="0" smtClean="0"/>
+              <a:t>    }</a:t>
+            </a:r>
+          </a:p>
+          <a:p>
+            <a:endParaRPr lang="id-ID" sz="1400" dirty="0" smtClean="0"/>
+          </a:p>
+          <a:p>
+            <a:r>
+              <a:rPr lang="id-ID" sz="1400" dirty="0" smtClean="0"/>
+              <a:t>    return 0;</a:t>
+            </a:r>
+          </a:p>
+          <a:p>
+            <a:r>
+              <a:rPr lang="id-ID" sz="1400" dirty="0" smtClean="0"/>
+              <a:t>}</a:t>
+            </a:r>
+          </a:p>
+          <a:p>
+            <a:endParaRPr lang="id-ID" sz="1400" dirty="0"/>
+          </a:p>
+        </p:txBody>
+      </p:sp>
+    </p:spTree>
+  </p:cSld>
+  <p:clrMapOvr>
+    <a:masterClrMapping/>
+  </p:clrMapOvr>
+</p:sld>
+</file>
+
+<file path=ppt/slides/slide17.xml><?xml version="1.0" encoding="utf-8"?>
+<p:sld xmlns:a="http://schemas.openxmlformats.org/drawingml/2006/main" xmlns:r="http://schemas.openxmlformats.org/officeDocument/2006/relationships" xmlns:p="http://schemas.openxmlformats.org/presentationml/2006/main">
+  <p:cSld>
+    <p:spTree>
+      <p:nvGrpSpPr>
+        <p:cNvPr id="1" name=""/>
+        <p:cNvGrpSpPr/>
+        <p:nvPr/>
+      </p:nvGrpSpPr>
+      <p:grpSpPr>
+        <a:xfrm>
+          <a:off x="0" y="0"/>
+          <a:ext cx="0" cy="0"/>
+          <a:chOff x="0" y="0"/>
+          <a:chExt cx="0" cy="0"/>
+        </a:xfrm>
+      </p:grpSpPr>
+      <p:sp>
+        <p:nvSpPr>
+          <p:cNvPr id="3" name="Content Placeholder 2"/>
+          <p:cNvSpPr>
+            <a:spLocks noGrp="1"/>
+          </p:cNvSpPr>
+          <p:nvPr>
+            <p:ph idx="1"/>
+          </p:nvPr>
+        </p:nvSpPr>
+        <p:spPr>
+          <a:xfrm>
+            <a:off x="502920" y="530352"/>
+            <a:ext cx="8183880" cy="5470416"/>
+          </a:xfrm>
+        </p:spPr>
+        <p:txBody>
+          <a:bodyPr>
+            <a:normAutofit fontScale="55000" lnSpcReduction="20000"/>
+          </a:bodyPr>
+          <a:lstStyle/>
+          <a:p>
+            <a:pPr>
+              <a:buNone/>
+            </a:pPr>
+            <a:r>
+              <a:rPr lang="id-ID" dirty="0" smtClean="0"/>
+              <a:t>Dengan Switch:</a:t>
+            </a:r>
+          </a:p>
+          <a:p>
+            <a:endParaRPr lang="id-ID" dirty="0" smtClean="0"/>
+          </a:p>
+          <a:p>
+            <a:r>
+              <a:rPr lang="id-ID" dirty="0" smtClean="0"/>
+              <a:t>#include &lt;iostream&gt;</a:t>
+            </a:r>
+          </a:p>
+          <a:p>
+            <a:r>
+              <a:rPr lang="id-ID" dirty="0" smtClean="0"/>
+              <a:t>using namespace std;</a:t>
+            </a:r>
+          </a:p>
+          <a:p>
+            <a:endParaRPr lang="id-ID" dirty="0" smtClean="0"/>
+          </a:p>
+          <a:p>
+            <a:r>
+              <a:rPr lang="id-ID" dirty="0" smtClean="0"/>
+              <a:t>int main() {</a:t>
+            </a:r>
+          </a:p>
+          <a:p>
+            <a:r>
+              <a:rPr lang="id-ID" dirty="0" smtClean="0"/>
+              <a:t>    int hari;</a:t>
+            </a:r>
+          </a:p>
+          <a:p>
+            <a:r>
+              <a:rPr lang="id-ID" dirty="0" smtClean="0"/>
+              <a:t>    cout &lt;&lt; "Masukkan angka hari (1-7): ";</a:t>
+            </a:r>
+          </a:p>
+          <a:p>
+            <a:r>
+              <a:rPr lang="id-ID" dirty="0" smtClean="0"/>
+              <a:t>    cin &gt;&gt; hari;</a:t>
+            </a:r>
+          </a:p>
+          <a:p>
+            <a:endParaRPr lang="id-ID" dirty="0" smtClean="0"/>
+          </a:p>
+          <a:p>
+            <a:r>
+              <a:rPr lang="id-ID" dirty="0" smtClean="0"/>
+              <a:t>    switch (hari) {</a:t>
+            </a:r>
+          </a:p>
+          <a:p>
+            <a:r>
+              <a:rPr lang="id-ID" dirty="0" smtClean="0"/>
+              <a:t>        case 1: cout &lt;&lt; "Senin\n"; break;</a:t>
+            </a:r>
+          </a:p>
+          <a:p>
+            <a:r>
+              <a:rPr lang="id-ID" dirty="0" smtClean="0"/>
+              <a:t>        case 2: cout &lt;&lt; "Selasa\n"; break;</a:t>
+            </a:r>
+          </a:p>
+          <a:p>
+            <a:r>
+              <a:rPr lang="id-ID" dirty="0" smtClean="0"/>
+              <a:t>        case 3: cout &lt;&lt; "Rabu\n"; break;</a:t>
+            </a:r>
+          </a:p>
+          <a:p>
+            <a:r>
+              <a:rPr lang="id-ID" dirty="0" smtClean="0"/>
+              <a:t>        case 4: cout &lt;&lt; "Kamis\n"; break;</a:t>
+            </a:r>
+          </a:p>
+          <a:p>
+            <a:r>
+              <a:rPr lang="id-ID" dirty="0" smtClean="0"/>
+              <a:t>        case 5: cout &lt;&lt; "Jumat\n"; break;</a:t>
+            </a:r>
+          </a:p>
+          <a:p>
+            <a:r>
+              <a:rPr lang="id-ID" dirty="0" smtClean="0"/>
+              <a:t>        case 6: cout &lt;&lt; "Sabtu\n"; break;</a:t>
+            </a:r>
+          </a:p>
+          <a:p>
+            <a:r>
+              <a:rPr lang="id-ID" dirty="0" smtClean="0"/>
+              <a:t>        case 7: cout &lt;&lt; "Minggu\n"; break;</a:t>
+            </a:r>
+          </a:p>
+          <a:p>
+            <a:r>
+              <a:rPr lang="id-ID" dirty="0" smtClean="0"/>
+              <a:t>        default: cout &lt;&lt; "Angka tidak valid!\n";</a:t>
+            </a:r>
+          </a:p>
+          <a:p>
+            <a:r>
+              <a:rPr lang="id-ID" dirty="0" smtClean="0"/>
+              <a:t>    }</a:t>
+            </a:r>
+          </a:p>
+          <a:p>
+            <a:endParaRPr lang="id-ID" dirty="0" smtClean="0"/>
+          </a:p>
+          <a:p>
+            <a:r>
+              <a:rPr lang="id-ID" dirty="0" smtClean="0"/>
+              <a:t>    return 0;</a:t>
+            </a:r>
+          </a:p>
+          <a:p>
+            <a:r>
+              <a:rPr lang="id-ID" dirty="0" smtClean="0"/>
+              <a:t>}</a:t>
+            </a:r>
+          </a:p>
+          <a:p>
+            <a:endParaRPr lang="id-ID" dirty="0"/>
+          </a:p>
+        </p:txBody>
+      </p:sp>
+    </p:spTree>
+  </p:cSld>
+  <p:clrMapOvr>
+    <a:masterClrMapping/>
+  </p:clrMapOvr>
+</p:sld>
+</file>
+
+<file path=ppt/slides/slide18.xml><?xml version="1.0" encoding="utf-8"?>
+<p:sld xmlns:a="http://schemas.openxmlformats.org/drawingml/2006/main" xmlns:r="http://schemas.openxmlformats.org/officeDocument/2006/relationships" xmlns:p="http://schemas.openxmlformats.org/presentationml/2006/main">
+  <p:cSld>
+    <p:spTree>
+      <p:nvGrpSpPr>
+        <p:cNvPr id="1" name=""/>
+        <p:cNvGrpSpPr/>
+        <p:nvPr/>
+      </p:nvGrpSpPr>
+      <p:grpSpPr>
+        <a:xfrm>
+          <a:off x="0" y="0"/>
+          <a:ext cx="0" cy="0"/>
+          <a:chOff x="0" y="0"/>
+          <a:chExt cx="0" cy="0"/>
+        </a:xfrm>
+      </p:grpSpPr>
+      <p:sp>
+        <p:nvSpPr>
+          <p:cNvPr id="2" name="Title 1"/>
+          <p:cNvSpPr>
+            <a:spLocks noGrp="1"/>
+          </p:cNvSpPr>
+          <p:nvPr>
+            <p:ph type="title"/>
+          </p:nvPr>
+        </p:nvSpPr>
+        <p:spPr/>
+        <p:txBody>
+          <a:bodyPr anchor="ctr"/>
+          <a:lstStyle/>
+          <a:p>
+            <a:pPr algn="ctr"/>
+            <a:r>
+              <a:rPr lang="id-ID" dirty="0" smtClean="0"/>
+              <a:t>Perulangan</a:t>
+            </a:r>
+            <a:endParaRPr lang="id-ID" dirty="0"/>
+          </a:p>
+        </p:txBody>
+      </p:sp>
+      <p:sp>
+        <p:nvSpPr>
+          <p:cNvPr id="3" name="Content Placeholder 2"/>
+          <p:cNvSpPr>
+            <a:spLocks noGrp="1"/>
+          </p:cNvSpPr>
+          <p:nvPr>
+            <p:ph idx="1"/>
+          </p:nvPr>
+        </p:nvSpPr>
+        <p:spPr/>
+        <p:txBody>
+          <a:bodyPr>
+            <a:normAutofit fontScale="92500" lnSpcReduction="10000"/>
+          </a:bodyPr>
+          <a:lstStyle/>
+          <a:p>
+            <a:pPr>
+              <a:buNone/>
+            </a:pPr>
+            <a:r>
+              <a:rPr lang="id-ID" dirty="0" smtClean="0"/>
+              <a:t>Dengan for</a:t>
+            </a:r>
+          </a:p>
+          <a:p>
+            <a:pPr>
+              <a:buNone/>
+            </a:pPr>
+            <a:r>
+              <a:rPr lang="id-ID" dirty="0" smtClean="0"/>
+              <a:t>#include &lt;iostream&gt;</a:t>
+            </a:r>
+          </a:p>
+          <a:p>
+            <a:pPr>
+              <a:buNone/>
+            </a:pPr>
+            <a:r>
+              <a:rPr lang="id-ID" dirty="0" smtClean="0"/>
+              <a:t>using namespace std;</a:t>
+            </a:r>
+          </a:p>
+          <a:p>
+            <a:pPr>
+              <a:buNone/>
+            </a:pPr>
+            <a:endParaRPr lang="id-ID" dirty="0" smtClean="0"/>
+          </a:p>
+          <a:p>
+            <a:pPr>
+              <a:buNone/>
+            </a:pPr>
+            <a:r>
+              <a:rPr lang="id-ID" dirty="0" smtClean="0"/>
+              <a:t>int main() {</a:t>
+            </a:r>
+          </a:p>
+          <a:p>
+            <a:pPr>
+              <a:buNone/>
+            </a:pPr>
+            <a:r>
+              <a:rPr lang="id-ID" dirty="0" smtClean="0"/>
+              <a:t>    for (int i = 1; i &lt;= 5; i++) {</a:t>
+            </a:r>
+          </a:p>
+          <a:p>
+            <a:pPr>
+              <a:buNone/>
+            </a:pPr>
+            <a:r>
+              <a:rPr lang="id-ID" dirty="0" smtClean="0"/>
+              <a:t>        cout &lt;&lt; "Perulangan ke-" &lt;&lt; i &lt;&lt; endl;</a:t>
+            </a:r>
+          </a:p>
+          <a:p>
+            <a:pPr>
+              <a:buNone/>
+            </a:pPr>
+            <a:r>
+              <a:rPr lang="id-ID" dirty="0" smtClean="0"/>
+              <a:t>    }</a:t>
+            </a:r>
+          </a:p>
+          <a:p>
+            <a:pPr>
+              <a:buNone/>
+            </a:pPr>
+            <a:r>
+              <a:rPr lang="id-ID" dirty="0" smtClean="0"/>
+              <a:t>    return 0;</a:t>
+            </a:r>
+          </a:p>
+          <a:p>
+            <a:pPr>
+              <a:buNone/>
+            </a:pPr>
+            <a:r>
+              <a:rPr lang="id-ID" dirty="0" smtClean="0"/>
+              <a:t>}</a:t>
+            </a:r>
+          </a:p>
+          <a:p>
+            <a:pPr>
+              <a:buNone/>
+            </a:pPr>
+            <a:endParaRPr lang="id-ID" dirty="0"/>
+          </a:p>
+        </p:txBody>
+      </p:sp>
+    </p:spTree>
+  </p:cSld>
+  <p:clrMapOvr>
+    <a:masterClrMapping/>
+  </p:clrMapOvr>
+  <p:timing>
+    <p:tnLst>
+      <p:par>
+        <p:cTn id="1" dur="indefinite" restart="never" nodeType="tmRoot"/>
+      </p:par>
+    </p:tnLst>
+  </p:timing>
+</p:sld>
+</file>
+
+<file path=ppt/slides/slide19.xml><?xml version="1.0" encoding="utf-8"?>
+<p:sld xmlns:a="http://schemas.openxmlformats.org/drawingml/2006/main" xmlns:r="http://schemas.openxmlformats.org/officeDocument/2006/relationships" xmlns:p="http://schemas.openxmlformats.org/presentationml/2006/main">
+  <p:cSld>
+    <p:spTree>
+      <p:nvGrpSpPr>
+        <p:cNvPr id="1" name=""/>
+        <p:cNvGrpSpPr/>
+        <p:nvPr/>
+      </p:nvGrpSpPr>
+      <p:grpSpPr>
+        <a:xfrm>
+          <a:off x="0" y="0"/>
+          <a:ext cx="0" cy="0"/>
+          <a:chOff x="0" y="0"/>
+          <a:chExt cx="0" cy="0"/>
+        </a:xfrm>
+      </p:grpSpPr>
+      <p:sp>
+        <p:nvSpPr>
+          <p:cNvPr id="3" name="Content Placeholder 2"/>
+          <p:cNvSpPr>
+            <a:spLocks noGrp="1"/>
+          </p:cNvSpPr>
+          <p:nvPr>
+            <p:ph idx="1"/>
+          </p:nvPr>
+        </p:nvSpPr>
+        <p:spPr>
+          <a:xfrm>
+            <a:off x="502920" y="530352"/>
+            <a:ext cx="8183880" cy="5470416"/>
+          </a:xfrm>
+        </p:spPr>
+        <p:txBody>
+          <a:bodyPr>
+            <a:normAutofit fontScale="92500"/>
+          </a:bodyPr>
+          <a:lstStyle/>
+          <a:p>
+            <a:pPr>
+              <a:buNone/>
+            </a:pPr>
+            <a:r>
+              <a:rPr lang="id-ID" dirty="0" smtClean="0"/>
+              <a:t>Dengan while</a:t>
+            </a:r>
+          </a:p>
+          <a:p>
+            <a:pPr>
+              <a:buNone/>
+            </a:pPr>
+            <a:r>
+              <a:rPr lang="id-ID" dirty="0" smtClean="0"/>
+              <a:t>#include &lt;iostream&gt;</a:t>
+            </a:r>
+          </a:p>
+          <a:p>
+            <a:pPr>
+              <a:buNone/>
+            </a:pPr>
+            <a:r>
+              <a:rPr lang="id-ID" dirty="0" smtClean="0"/>
+              <a:t>using namespace std;</a:t>
+            </a:r>
+          </a:p>
+          <a:p>
+            <a:pPr>
+              <a:buNone/>
+            </a:pPr>
+            <a:endParaRPr lang="id-ID" dirty="0" smtClean="0"/>
+          </a:p>
+          <a:p>
+            <a:pPr>
+              <a:buNone/>
+            </a:pPr>
+            <a:r>
+              <a:rPr lang="id-ID" dirty="0" smtClean="0"/>
+              <a:t>int main() {</a:t>
+            </a:r>
+          </a:p>
+          <a:p>
+            <a:pPr>
+              <a:buNone/>
+            </a:pPr>
+            <a:r>
+              <a:rPr lang="id-ID" dirty="0" smtClean="0"/>
+              <a:t>    int i = 1;</a:t>
+            </a:r>
+          </a:p>
+          <a:p>
+            <a:pPr>
+              <a:buNone/>
+            </a:pPr>
+            <a:r>
+              <a:rPr lang="id-ID" dirty="0" smtClean="0"/>
+              <a:t>    while (i &lt;= 5) {</a:t>
+            </a:r>
+          </a:p>
+          <a:p>
+            <a:pPr>
+              <a:buNone/>
+            </a:pPr>
+            <a:r>
+              <a:rPr lang="id-ID" dirty="0" smtClean="0"/>
+              <a:t>        cout &lt;&lt; "Perulangan ke-" &lt;&lt; i &lt;&lt; endl;</a:t>
+            </a:r>
+          </a:p>
+          <a:p>
+            <a:pPr>
+              <a:buNone/>
+            </a:pPr>
+            <a:r>
+              <a:rPr lang="id-ID" dirty="0" smtClean="0"/>
+              <a:t>        i++;</a:t>
+            </a:r>
+          </a:p>
+          <a:p>
+            <a:pPr>
+              <a:buNone/>
+            </a:pPr>
+            <a:r>
+              <a:rPr lang="id-ID" dirty="0" smtClean="0"/>
+              <a:t>    }</a:t>
+            </a:r>
+          </a:p>
+          <a:p>
+            <a:pPr>
+              <a:buNone/>
+            </a:pPr>
+            <a:r>
+              <a:rPr lang="id-ID" dirty="0" smtClean="0"/>
+              <a:t>    return 0;</a:t>
+            </a:r>
+          </a:p>
+          <a:p>
+            <a:pPr>
+              <a:buNone/>
+            </a:pPr>
+            <a:r>
+              <a:rPr lang="id-ID" dirty="0" smtClean="0"/>
+              <a:t>}</a:t>
+            </a:r>
+          </a:p>
+          <a:p>
+            <a:pPr>
+              <a:buNone/>
+            </a:pPr>
+            <a:endParaRPr lang="id-ID" dirty="0"/>
+          </a:p>
+        </p:txBody>
+      </p:sp>
+    </p:spTree>
+  </p:cSld>
+  <p:clrMapOvr>
+    <a:masterClrMapping/>
+  </p:clrMapOvr>
+  <p:timing>
+    <p:tnLst>
+      <p:par>
+        <p:cTn id="1" dur="indefinite" restart="never" nodeType="tmRoot"/>
+      </p:par>
+    </p:tnLst>
+  </p:timing>
+</p:sld>
+</file>
+
 <file path=ppt/slides/slide2.xml><?xml version="1.0" encoding="utf-8"?>
 <p:sld xmlns:a="http://schemas.openxmlformats.org/drawingml/2006/main" xmlns:r="http://schemas.openxmlformats.org/officeDocument/2006/relationships" xmlns:p="http://schemas.openxmlformats.org/presentationml/2006/main">
   <p:cSld>
@@ -5932,6 +6945,340 @@
               <a:rPr lang="id-ID" dirty="0" smtClean="0"/>
               <a:t>Bahasa yang cukup susah dipelari ketimbang javascript, pyhton, PHP dll</a:t>
             </a:r>
+            <a:endParaRPr lang="id-ID" dirty="0"/>
+          </a:p>
+        </p:txBody>
+      </p:sp>
+    </p:spTree>
+  </p:cSld>
+  <p:clrMapOvr>
+    <a:masterClrMapping/>
+  </p:clrMapOvr>
+  <p:timing>
+    <p:tnLst>
+      <p:par>
+        <p:cTn id="1" dur="indefinite" restart="never" nodeType="tmRoot"/>
+      </p:par>
+    </p:tnLst>
+  </p:timing>
+</p:sld>
+</file>
+
+<file path=ppt/slides/slide20.xml><?xml version="1.0" encoding="utf-8"?>
+<p:sld xmlns:a="http://schemas.openxmlformats.org/drawingml/2006/main" xmlns:r="http://schemas.openxmlformats.org/officeDocument/2006/relationships" xmlns:p="http://schemas.openxmlformats.org/presentationml/2006/main">
+  <p:cSld>
+    <p:spTree>
+      <p:nvGrpSpPr>
+        <p:cNvPr id="1" name=""/>
+        <p:cNvGrpSpPr/>
+        <p:nvPr/>
+      </p:nvGrpSpPr>
+      <p:grpSpPr>
+        <a:xfrm>
+          <a:off x="0" y="0"/>
+          <a:ext cx="0" cy="0"/>
+          <a:chOff x="0" y="0"/>
+          <a:chExt cx="0" cy="0"/>
+        </a:xfrm>
+      </p:grpSpPr>
+      <p:sp>
+        <p:nvSpPr>
+          <p:cNvPr id="3" name="Content Placeholder 2"/>
+          <p:cNvSpPr>
+            <a:spLocks noGrp="1"/>
+          </p:cNvSpPr>
+          <p:nvPr>
+            <p:ph idx="1"/>
+          </p:nvPr>
+        </p:nvSpPr>
+        <p:spPr>
+          <a:xfrm>
+            <a:off x="502920" y="530352"/>
+            <a:ext cx="8183880" cy="5256102"/>
+          </a:xfrm>
+        </p:spPr>
+        <p:txBody>
+          <a:bodyPr>
+            <a:normAutofit fontScale="92500" lnSpcReduction="10000"/>
+          </a:bodyPr>
+          <a:lstStyle/>
+          <a:p>
+            <a:pPr>
+              <a:buNone/>
+            </a:pPr>
+            <a:r>
+              <a:rPr lang="id-ID" dirty="0" smtClean="0"/>
+              <a:t>Dengan do while</a:t>
+            </a:r>
+          </a:p>
+          <a:p>
+            <a:pPr>
+              <a:buNone/>
+            </a:pPr>
+            <a:r>
+              <a:rPr lang="id-ID" dirty="0" smtClean="0"/>
+              <a:t>#include &lt;iostream&gt;</a:t>
+            </a:r>
+          </a:p>
+          <a:p>
+            <a:pPr>
+              <a:buNone/>
+            </a:pPr>
+            <a:r>
+              <a:rPr lang="id-ID" dirty="0" smtClean="0"/>
+              <a:t>using namespace std;</a:t>
+            </a:r>
+          </a:p>
+          <a:p>
+            <a:pPr>
+              <a:buNone/>
+            </a:pPr>
+            <a:endParaRPr lang="id-ID" dirty="0" smtClean="0"/>
+          </a:p>
+          <a:p>
+            <a:pPr>
+              <a:buNone/>
+            </a:pPr>
+            <a:r>
+              <a:rPr lang="id-ID" dirty="0" smtClean="0"/>
+              <a:t>int main() {</a:t>
+            </a:r>
+          </a:p>
+          <a:p>
+            <a:pPr>
+              <a:buNone/>
+            </a:pPr>
+            <a:r>
+              <a:rPr lang="id-ID" dirty="0" smtClean="0"/>
+              <a:t>    int i = 1;</a:t>
+            </a:r>
+          </a:p>
+          <a:p>
+            <a:pPr>
+              <a:buNone/>
+            </a:pPr>
+            <a:r>
+              <a:rPr lang="id-ID" dirty="0" smtClean="0"/>
+              <a:t>    do {</a:t>
+            </a:r>
+          </a:p>
+          <a:p>
+            <a:pPr>
+              <a:buNone/>
+            </a:pPr>
+            <a:r>
+              <a:rPr lang="id-ID" dirty="0" smtClean="0"/>
+              <a:t>        cout &lt;&lt; "Perulangan ke-" &lt;&lt; i &lt;&lt; endl;</a:t>
+            </a:r>
+          </a:p>
+          <a:p>
+            <a:pPr>
+              <a:buNone/>
+            </a:pPr>
+            <a:r>
+              <a:rPr lang="id-ID" dirty="0" smtClean="0"/>
+              <a:t>        i++;</a:t>
+            </a:r>
+          </a:p>
+          <a:p>
+            <a:pPr>
+              <a:buNone/>
+            </a:pPr>
+            <a:r>
+              <a:rPr lang="id-ID" dirty="0" smtClean="0"/>
+              <a:t>    } while (i &lt;= 5);</a:t>
+            </a:r>
+          </a:p>
+          <a:p>
+            <a:pPr>
+              <a:buNone/>
+            </a:pPr>
+            <a:r>
+              <a:rPr lang="id-ID" dirty="0" smtClean="0"/>
+              <a:t>    return 0;</a:t>
+            </a:r>
+          </a:p>
+          <a:p>
+            <a:pPr>
+              <a:buNone/>
+            </a:pPr>
+            <a:r>
+              <a:rPr lang="id-ID" dirty="0" smtClean="0"/>
+              <a:t>}</a:t>
+            </a:r>
+          </a:p>
+          <a:p>
+            <a:pPr>
+              <a:buNone/>
+            </a:pPr>
+            <a:endParaRPr lang="id-ID" dirty="0"/>
+          </a:p>
+        </p:txBody>
+      </p:sp>
+    </p:spTree>
+  </p:cSld>
+  <p:clrMapOvr>
+    <a:masterClrMapping/>
+  </p:clrMapOvr>
+</p:sld>
+</file>
+
+<file path=ppt/slides/slide21.xml><?xml version="1.0" encoding="utf-8"?>
+<p:sld xmlns:a="http://schemas.openxmlformats.org/drawingml/2006/main" xmlns:r="http://schemas.openxmlformats.org/officeDocument/2006/relationships" xmlns:p="http://schemas.openxmlformats.org/presentationml/2006/main">
+  <p:cSld>
+    <p:spTree>
+      <p:nvGrpSpPr>
+        <p:cNvPr id="1" name=""/>
+        <p:cNvGrpSpPr/>
+        <p:nvPr/>
+      </p:nvGrpSpPr>
+      <p:grpSpPr>
+        <a:xfrm>
+          <a:off x="0" y="0"/>
+          <a:ext cx="0" cy="0"/>
+          <a:chOff x="0" y="0"/>
+          <a:chExt cx="0" cy="0"/>
+        </a:xfrm>
+      </p:grpSpPr>
+      <p:sp>
+        <p:nvSpPr>
+          <p:cNvPr id="3" name="Content Placeholder 2"/>
+          <p:cNvSpPr>
+            <a:spLocks noGrp="1"/>
+          </p:cNvSpPr>
+          <p:nvPr>
+            <p:ph idx="1"/>
+          </p:nvPr>
+        </p:nvSpPr>
+        <p:spPr>
+          <a:xfrm>
+            <a:off x="502920" y="530352"/>
+            <a:ext cx="8183880" cy="5256102"/>
+          </a:xfrm>
+        </p:spPr>
+        <p:txBody>
+          <a:bodyPr>
+            <a:normAutofit fontScale="92500" lnSpcReduction="10000"/>
+          </a:bodyPr>
+          <a:lstStyle/>
+          <a:p>
+            <a:pPr>
+              <a:buNone/>
+            </a:pPr>
+            <a:r>
+              <a:rPr lang="id-ID" dirty="0" smtClean="0"/>
+              <a:t>Nested Loop</a:t>
+            </a:r>
+          </a:p>
+          <a:p>
+            <a:pPr>
+              <a:buNone/>
+            </a:pPr>
+            <a:r>
+              <a:rPr lang="id-ID" dirty="0" smtClean="0"/>
+              <a:t>#include &lt;iostream&gt;</a:t>
+            </a:r>
+          </a:p>
+          <a:p>
+            <a:pPr>
+              <a:buNone/>
+            </a:pPr>
+            <a:r>
+              <a:rPr lang="id-ID" dirty="0" smtClean="0"/>
+              <a:t>using namespace std;</a:t>
+            </a:r>
+          </a:p>
+          <a:p>
+            <a:pPr>
+              <a:buNone/>
+            </a:pPr>
+            <a:endParaRPr lang="id-ID" dirty="0" smtClean="0"/>
+          </a:p>
+          <a:p>
+            <a:pPr>
+              <a:buNone/>
+            </a:pPr>
+            <a:r>
+              <a:rPr lang="id-ID" dirty="0" smtClean="0"/>
+              <a:t>int main() {</a:t>
+            </a:r>
+          </a:p>
+          <a:p>
+            <a:pPr>
+              <a:buNone/>
+            </a:pPr>
+            <a:r>
+              <a:rPr lang="id-ID" dirty="0" smtClean="0"/>
+              <a:t>    for (int i = 1; i &lt;= 3; i++) {</a:t>
+            </a:r>
+          </a:p>
+          <a:p>
+            <a:pPr>
+              <a:buNone/>
+            </a:pPr>
+            <a:r>
+              <a:rPr lang="id-ID" dirty="0" smtClean="0"/>
+              <a:t>        for (int j = 1; j &lt;= 3; j++) {</a:t>
+            </a:r>
+          </a:p>
+          <a:p>
+            <a:pPr>
+              <a:buNone/>
+            </a:pPr>
+            <a:r>
+              <a:rPr lang="id-ID" dirty="0" smtClean="0"/>
+              <a:t>            cout &lt;&lt; "(" &lt;&lt; i &lt;&lt; "," &lt;&lt; j &lt;&lt; ") ";</a:t>
+            </a:r>
+          </a:p>
+          <a:p>
+            <a:pPr>
+              <a:buNone/>
+            </a:pPr>
+            <a:r>
+              <a:rPr lang="id-ID" dirty="0" smtClean="0"/>
+              <a:t>        }</a:t>
+            </a:r>
+          </a:p>
+          <a:p>
+            <a:pPr>
+              <a:buNone/>
+            </a:pPr>
+            <a:r>
+              <a:rPr lang="id-ID" dirty="0" smtClean="0"/>
+              <a:t>        cout &lt;&lt; endl;</a:t>
+            </a:r>
+          </a:p>
+          <a:p>
+            <a:pPr>
+              <a:buNone/>
+            </a:pPr>
+            <a:r>
+              <a:rPr lang="id-ID" dirty="0" smtClean="0"/>
+              <a:t>    }</a:t>
+            </a:r>
+          </a:p>
+          <a:p>
+            <a:pPr>
+              <a:buNone/>
+            </a:pPr>
+            <a:r>
+              <a:rPr lang="id-ID" dirty="0" smtClean="0"/>
+              <a:t>    return 0;</a:t>
+            </a:r>
+          </a:p>
+          <a:p>
+            <a:pPr>
+              <a:buNone/>
+            </a:pPr>
+            <a:r>
+              <a:rPr lang="id-ID" dirty="0" smtClean="0"/>
+              <a:t>}</a:t>
+            </a:r>
+          </a:p>
+          <a:p>
+            <a:pPr>
+              <a:buNone/>
+            </a:pPr>
             <a:endParaRPr lang="id-ID" dirty="0"/>
           </a:p>
         </p:txBody>
@@ -5995,6 +7342,13 @@
   <p:clrMapOvr>
     <a:masterClrMapping/>
   </p:clrMapOvr>
+  <p:timing>
+    <p:tnLst>
+      <p:par>
+        <p:cTn id="1" dur="indefinite" restart="never" nodeType="tmRoot"/>
+      </p:par>
+    </p:tnLst>
+  </p:timing>
 </p:sld>
 </file>
 
@@ -6150,7 +7504,7 @@
           <a:p>
             <a:r>
               <a:rPr lang="id-ID" dirty="0" smtClean="0"/>
-              <a:t>    cout &lt;&lt; "Hello, World!" &lt;&lt; endl; // menampilkan teks ke layar</a:t>
+              <a:t>    std::cout &lt;&lt; "Hello, World!" &lt;&lt; endl; // menampilkan teks ke layar</a:t>
             </a:r>
           </a:p>
           <a:p>

</xml_diff>